<commit_message>
update class 5 ppt
</commit_message>
<xml_diff>
--- a/class5/digitalframeworks-5.pptx
+++ b/class5/digitalframeworks-5.pptx
@@ -5,7 +5,7 @@
     <p:sldMasterId id="2147484135" r:id="rId1"/>
   </p:sldMasterIdLst>
   <p:notesMasterIdLst>
-    <p:notesMasterId r:id="rId21"/>
+    <p:notesMasterId r:id="rId22"/>
   </p:notesMasterIdLst>
   <p:sldIdLst>
     <p:sldId id="256" r:id="rId2"/>
@@ -18,15 +18,16 @@
     <p:sldId id="319" r:id="rId9"/>
     <p:sldId id="314" r:id="rId10"/>
     <p:sldId id="315" r:id="rId11"/>
-    <p:sldId id="323" r:id="rId12"/>
-    <p:sldId id="324" r:id="rId13"/>
-    <p:sldId id="325" r:id="rId14"/>
-    <p:sldId id="326" r:id="rId15"/>
-    <p:sldId id="320" r:id="rId16"/>
-    <p:sldId id="321" r:id="rId17"/>
-    <p:sldId id="322" r:id="rId18"/>
-    <p:sldId id="327" r:id="rId19"/>
-    <p:sldId id="328" r:id="rId20"/>
+    <p:sldId id="329" r:id="rId12"/>
+    <p:sldId id="323" r:id="rId13"/>
+    <p:sldId id="324" r:id="rId14"/>
+    <p:sldId id="325" r:id="rId15"/>
+    <p:sldId id="326" r:id="rId16"/>
+    <p:sldId id="320" r:id="rId17"/>
+    <p:sldId id="321" r:id="rId18"/>
+    <p:sldId id="322" r:id="rId19"/>
+    <p:sldId id="327" r:id="rId20"/>
+    <p:sldId id="328" r:id="rId21"/>
   </p:sldIdLst>
   <p:sldSz cx="9144000" cy="6858000" type="screen4x3"/>
   <p:notesSz cx="6858000" cy="9144000"/>
@@ -522,14 +523,6 @@
           <a:bodyPr/>
           <a:lstStyle/>
           <a:p>
-            <a:r>
-              <a:rPr lang="en-US" dirty="0" smtClean="0"/>
-              <a:t>Sort</a:t>
-            </a:r>
-            <a:r>
-              <a:rPr lang="en-US" baseline="0" dirty="0" smtClean="0"/>
-              <a:t> by wage (min), filter by office (mayor), group and look at highest average (DOIT)</a:t>
-            </a:r>
             <a:endParaRPr lang="en-US" dirty="0"/>
           </a:p>
         </p:txBody>
@@ -551,7 +544,7 @@
           <a:p>
             <a:fld id="{C1A2D630-CB31-6947-A638-73B19FB0DAF9}" type="slidenum">
               <a:rPr lang="en-US" smtClean="0"/>
-              <a:t>12</a:t>
+              <a:t>11</a:t>
             </a:fld>
             <a:endParaRPr lang="en-US"/>
           </a:p>
@@ -560,7 +553,7 @@
     </p:spTree>
     <p:extLst>
       <p:ext uri="{BB962C8B-B14F-4D97-AF65-F5344CB8AC3E}">
-        <p14:creationId xmlns:p14="http://schemas.microsoft.com/office/powerpoint/2010/main" val="2733602201"/>
+        <p14:creationId xmlns:p14="http://schemas.microsoft.com/office/powerpoint/2010/main" val="3056239287"/>
       </p:ext>
     </p:extLst>
   </p:cSld>
@@ -736,6 +729,98 @@
             <a:fld id="{C1A2D630-CB31-6947-A638-73B19FB0DAF9}" type="slidenum">
               <a:rPr lang="en-US" smtClean="0"/>
               <a:t>14</a:t>
+            </a:fld>
+            <a:endParaRPr lang="en-US"/>
+          </a:p>
+        </p:txBody>
+      </p:sp>
+    </p:spTree>
+    <p:extLst>
+      <p:ext uri="{BB962C8B-B14F-4D97-AF65-F5344CB8AC3E}">
+        <p14:creationId xmlns:p14="http://schemas.microsoft.com/office/powerpoint/2010/main" val="2733602201"/>
+      </p:ext>
+    </p:extLst>
+  </p:cSld>
+  <p:clrMapOvr>
+    <a:masterClrMapping/>
+  </p:clrMapOvr>
+</p:notes>
+</file>
+
+<file path=ppt/notesSlides/notesSlide4.xml><?xml version="1.0" encoding="utf-8"?>
+<p:notes xmlns:a="http://schemas.openxmlformats.org/drawingml/2006/main" xmlns:r="http://schemas.openxmlformats.org/officeDocument/2006/relationships" xmlns:p="http://schemas.openxmlformats.org/presentationml/2006/main">
+  <p:cSld>
+    <p:spTree>
+      <p:nvGrpSpPr>
+        <p:cNvPr id="1" name=""/>
+        <p:cNvGrpSpPr/>
+        <p:nvPr/>
+      </p:nvGrpSpPr>
+      <p:grpSpPr>
+        <a:xfrm>
+          <a:off x="0" y="0"/>
+          <a:ext cx="0" cy="0"/>
+          <a:chOff x="0" y="0"/>
+          <a:chExt cx="0" cy="0"/>
+        </a:xfrm>
+      </p:grpSpPr>
+      <p:sp>
+        <p:nvSpPr>
+          <p:cNvPr id="2" name="Slide Image Placeholder 1"/>
+          <p:cNvSpPr>
+            <a:spLocks noGrp="1" noRot="1" noChangeAspect="1"/>
+          </p:cNvSpPr>
+          <p:nvPr>
+            <p:ph type="sldImg"/>
+          </p:nvPr>
+        </p:nvSpPr>
+        <p:spPr/>
+      </p:sp>
+      <p:sp>
+        <p:nvSpPr>
+          <p:cNvPr id="3" name="Notes Placeholder 2"/>
+          <p:cNvSpPr>
+            <a:spLocks noGrp="1"/>
+          </p:cNvSpPr>
+          <p:nvPr>
+            <p:ph type="body" idx="1"/>
+          </p:nvPr>
+        </p:nvSpPr>
+        <p:spPr/>
+        <p:txBody>
+          <a:bodyPr/>
+          <a:lstStyle/>
+          <a:p>
+            <a:r>
+              <a:rPr lang="en-US" dirty="0" smtClean="0"/>
+              <a:t>Sort</a:t>
+            </a:r>
+            <a:r>
+              <a:rPr lang="en-US" baseline="0" dirty="0" smtClean="0"/>
+              <a:t> by wage (min), filter by office (mayor), group and look at highest average (DOIT)</a:t>
+            </a:r>
+            <a:endParaRPr lang="en-US" dirty="0"/>
+          </a:p>
+        </p:txBody>
+      </p:sp>
+      <p:sp>
+        <p:nvSpPr>
+          <p:cNvPr id="4" name="Slide Number Placeholder 3"/>
+          <p:cNvSpPr>
+            <a:spLocks noGrp="1"/>
+          </p:cNvSpPr>
+          <p:nvPr>
+            <p:ph type="sldNum" sz="quarter" idx="10"/>
+          </p:nvPr>
+        </p:nvSpPr>
+        <p:spPr/>
+        <p:txBody>
+          <a:bodyPr/>
+          <a:lstStyle/>
+          <a:p>
+            <a:fld id="{C1A2D630-CB31-6947-A638-73B19FB0DAF9}" type="slidenum">
+              <a:rPr lang="en-US" smtClean="0"/>
+              <a:t>15</a:t>
             </a:fld>
             <a:endParaRPr lang="en-US"/>
           </a:p>
@@ -4230,7 +4315,7 @@
           <a:p>
             <a:r>
               <a:rPr lang="en-US" dirty="0" smtClean="0"/>
-              <a:t>Chicago city salaries</a:t>
+              <a:t>Guest speaker</a:t>
             </a:r>
             <a:endParaRPr lang="en-US" dirty="0"/>
           </a:p>
@@ -4248,112 +4333,64 @@
         </p:nvSpPr>
         <p:spPr/>
         <p:txBody>
-          <a:bodyPr>
-            <a:normAutofit fontScale="92500" lnSpcReduction="10000"/>
-          </a:bodyPr>
-          <a:lstStyle/>
-          <a:p>
-            <a:r>
-              <a:rPr lang="en-US" dirty="0"/>
-              <a:t>Name</a:t>
-            </a:r>
-            <a:r>
-              <a:rPr lang="en-US" dirty="0"/>
-              <a:t> </a:t>
-            </a:r>
-            <a:endParaRPr lang="en-US" dirty="0" smtClean="0"/>
-          </a:p>
-          <a:p>
-            <a:r>
-              <a:rPr lang="en-US" dirty="0" smtClean="0"/>
-              <a:t>Job Titles</a:t>
-            </a:r>
-          </a:p>
-          <a:p>
-            <a:r>
-              <a:rPr lang="en-US" dirty="0" smtClean="0"/>
-              <a:t> Department</a:t>
-            </a:r>
-          </a:p>
-          <a:p>
-            <a:r>
-              <a:rPr lang="en-US" dirty="0" smtClean="0"/>
-              <a:t> </a:t>
-            </a:r>
-            <a:r>
-              <a:rPr lang="en-US" dirty="0"/>
-              <a:t>Full or Part-</a:t>
-            </a:r>
-            <a:r>
-              <a:rPr lang="en-US" dirty="0" smtClean="0"/>
-              <a:t>Time</a:t>
-            </a:r>
-          </a:p>
-          <a:p>
-            <a:r>
-              <a:rPr lang="en-US" dirty="0" smtClean="0"/>
-              <a:t> </a:t>
-            </a:r>
-            <a:r>
-              <a:rPr lang="en-US" dirty="0"/>
-              <a:t>Salary or Hourly</a:t>
-            </a:r>
-            <a:r>
-              <a:rPr lang="en-US" dirty="0"/>
-              <a:t> </a:t>
-            </a:r>
-            <a:endParaRPr lang="en-US" dirty="0" smtClean="0"/>
-          </a:p>
-          <a:p>
-            <a:r>
-              <a:rPr lang="en-US" dirty="0" smtClean="0"/>
-              <a:t>Typical </a:t>
-            </a:r>
-            <a:r>
-              <a:rPr lang="en-US" dirty="0"/>
-              <a:t>Hours</a:t>
-            </a:r>
-            <a:r>
-              <a:rPr lang="en-US" dirty="0"/>
-              <a:t> </a:t>
-            </a:r>
-            <a:endParaRPr lang="en-US" dirty="0" smtClean="0"/>
-          </a:p>
-          <a:p>
-            <a:r>
-              <a:rPr lang="en-US" dirty="0" smtClean="0"/>
-              <a:t>Annual </a:t>
-            </a:r>
-            <a:r>
-              <a:rPr lang="en-US" dirty="0"/>
-              <a:t>Salary</a:t>
-            </a:r>
-            <a:r>
-              <a:rPr lang="en-US" dirty="0"/>
-              <a:t> </a:t>
-            </a:r>
-            <a:endParaRPr lang="en-US" dirty="0" smtClean="0"/>
-          </a:p>
-          <a:p>
-            <a:r>
-              <a:rPr lang="en-US" dirty="0" smtClean="0"/>
-              <a:t>Hourly </a:t>
-            </a:r>
-            <a:r>
-              <a:rPr lang="en-US" dirty="0"/>
-              <a:t>Rate</a:t>
-            </a:r>
-            <a:r>
-              <a:rPr lang="en-US" dirty="0"/>
-              <a:t> </a:t>
-            </a:r>
-          </a:p>
-        </p:txBody>
-      </p:sp>
+          <a:bodyPr/>
+          <a:lstStyle/>
+          <a:p>
+            <a:r>
+              <a:rPr lang="en-US" dirty="0" smtClean="0"/>
+              <a:t>David Eads</a:t>
+            </a:r>
+          </a:p>
+          <a:p>
+            <a:pPr marL="0" indent="0">
+              <a:buNone/>
+            </a:pPr>
+            <a:r>
+              <a:rPr lang="en-US" i="1" dirty="0" smtClean="0"/>
+              <a:t>News applications developer, </a:t>
+            </a:r>
+            <a:r>
+              <a:rPr lang="en-US" i="1" dirty="0" err="1" smtClean="0"/>
+              <a:t>ProPublica</a:t>
+            </a:r>
+            <a:endParaRPr lang="en-US" i="1" dirty="0"/>
+          </a:p>
+        </p:txBody>
+      </p:sp>
+      <p:pic>
+        <p:nvPicPr>
+          <p:cNvPr id="4" name="Picture 3" descr="ydKs9KVu_400x400.jpg"/>
+          <p:cNvPicPr>
+            <a:picLocks noChangeAspect="1"/>
+          </p:cNvPicPr>
+          <p:nvPr/>
+        </p:nvPicPr>
+        <p:blipFill>
+          <a:blip r:embed="rId3">
+            <a:extLst>
+              <a:ext uri="{28A0092B-C50C-407E-A947-70E740481C1C}">
+                <a14:useLocalDpi xmlns:a14="http://schemas.microsoft.com/office/drawing/2010/main" val="0"/>
+              </a:ext>
+            </a:extLst>
+          </a:blip>
+          <a:stretch>
+            <a:fillRect/>
+          </a:stretch>
+        </p:blipFill>
+        <p:spPr>
+          <a:xfrm>
+            <a:off x="2941052" y="3284620"/>
+            <a:ext cx="3208422" cy="3208422"/>
+          </a:xfrm>
+          <a:prstGeom prst="rect">
+            <a:avLst/>
+          </a:prstGeom>
+        </p:spPr>
+      </p:pic>
     </p:spTree>
     <p:extLst>
       <p:ext uri="{BB962C8B-B14F-4D97-AF65-F5344CB8AC3E}">
-        <p14:creationId xmlns:p14="http://schemas.microsoft.com/office/powerpoint/2010/main" val="2830972930"/>
+        <p14:creationId xmlns:p14="http://schemas.microsoft.com/office/powerpoint/2010/main" val="2501560841"/>
       </p:ext>
     </p:extLst>
   </p:cSld>
@@ -4423,43 +4460,111 @@
         <p:spPr/>
         <p:txBody>
           <a:bodyPr>
-            <a:normAutofit/>
+            <a:normAutofit fontScale="92500" lnSpcReduction="10000"/>
           </a:bodyPr>
           <a:lstStyle/>
           <a:p>
             <a:r>
-              <a:rPr lang="en-US" dirty="0" smtClean="0"/>
-              <a:t>Exploring new data:</a:t>
-            </a:r>
-          </a:p>
-          <a:p>
-            <a:pPr lvl="1"/>
-            <a:r>
-              <a:rPr lang="en-US" dirty="0" smtClean="0"/>
-              <a:t>Sort/look for outliers</a:t>
-            </a:r>
-          </a:p>
-          <a:p>
-            <a:pPr lvl="1"/>
-            <a:r>
-              <a:rPr lang="en-US" dirty="0" smtClean="0"/>
-              <a:t>Filter</a:t>
-            </a:r>
-          </a:p>
-          <a:p>
-            <a:pPr lvl="1"/>
-            <a:r>
-              <a:rPr lang="en-US" dirty="0" smtClean="0"/>
-              <a:t>Group with pivot tables</a:t>
-            </a:r>
-            <a:endParaRPr lang="en-US" dirty="0"/>
+              <a:rPr lang="en-US" dirty="0"/>
+              <a:t>Name</a:t>
+            </a:r>
+            <a:r>
+              <a:rPr lang="en-US" dirty="0"/>
+              <a:t> </a:t>
+            </a:r>
+            <a:endParaRPr lang="en-US" dirty="0" smtClean="0"/>
+          </a:p>
+          <a:p>
+            <a:r>
+              <a:rPr lang="en-US" dirty="0" smtClean="0"/>
+              <a:t>Job Titles</a:t>
+            </a:r>
+          </a:p>
+          <a:p>
+            <a:r>
+              <a:rPr lang="en-US" dirty="0" smtClean="0"/>
+              <a:t> Department</a:t>
+            </a:r>
+          </a:p>
+          <a:p>
+            <a:r>
+              <a:rPr lang="en-US" dirty="0" smtClean="0"/>
+              <a:t> </a:t>
+            </a:r>
+            <a:r>
+              <a:rPr lang="en-US" dirty="0"/>
+              <a:t>Full or Part-</a:t>
+            </a:r>
+            <a:r>
+              <a:rPr lang="en-US" dirty="0" smtClean="0"/>
+              <a:t>Time</a:t>
+            </a:r>
+          </a:p>
+          <a:p>
+            <a:r>
+              <a:rPr lang="en-US" dirty="0" smtClean="0"/>
+              <a:t> </a:t>
+            </a:r>
+            <a:r>
+              <a:rPr lang="en-US" dirty="0"/>
+              <a:t>Salary or Hourly</a:t>
+            </a:r>
+            <a:r>
+              <a:rPr lang="en-US" dirty="0"/>
+              <a:t> </a:t>
+            </a:r>
+            <a:endParaRPr lang="en-US" dirty="0" smtClean="0"/>
+          </a:p>
+          <a:p>
+            <a:r>
+              <a:rPr lang="en-US" dirty="0" smtClean="0"/>
+              <a:t>Typical </a:t>
+            </a:r>
+            <a:r>
+              <a:rPr lang="en-US" dirty="0"/>
+              <a:t>Hours</a:t>
+            </a:r>
+            <a:r>
+              <a:rPr lang="en-US" dirty="0"/>
+              <a:t> </a:t>
+            </a:r>
+            <a:endParaRPr lang="en-US" dirty="0" smtClean="0"/>
+          </a:p>
+          <a:p>
+            <a:r>
+              <a:rPr lang="en-US" dirty="0" smtClean="0"/>
+              <a:t>Annual </a:t>
+            </a:r>
+            <a:r>
+              <a:rPr lang="en-US" dirty="0"/>
+              <a:t>Salary</a:t>
+            </a:r>
+            <a:r>
+              <a:rPr lang="en-US" dirty="0"/>
+              <a:t> </a:t>
+            </a:r>
+            <a:endParaRPr lang="en-US" dirty="0" smtClean="0"/>
+          </a:p>
+          <a:p>
+            <a:r>
+              <a:rPr lang="en-US" dirty="0" smtClean="0"/>
+              <a:t>Hourly </a:t>
+            </a:r>
+            <a:r>
+              <a:rPr lang="en-US" dirty="0"/>
+              <a:t>Rate</a:t>
+            </a:r>
+            <a:r>
+              <a:rPr lang="en-US" dirty="0"/>
+              <a:t> </a:t>
+            </a:r>
           </a:p>
         </p:txBody>
       </p:sp>
     </p:spTree>
     <p:extLst>
       <p:ext uri="{BB962C8B-B14F-4D97-AF65-F5344CB8AC3E}">
-        <p14:creationId xmlns:p14="http://schemas.microsoft.com/office/powerpoint/2010/main" val="138442176"/>
+        <p14:creationId xmlns:p14="http://schemas.microsoft.com/office/powerpoint/2010/main" val="2830972930"/>
       </p:ext>
     </p:extLst>
   </p:cSld>
@@ -4535,7 +4640,7 @@
           <a:p>
             <a:r>
               <a:rPr lang="en-US" dirty="0" smtClean="0"/>
-              <a:t>WARNINGS: Exploring new data:</a:t>
+              <a:t>Exploring new data:</a:t>
             </a:r>
           </a:p>
           <a:p>
@@ -4546,13 +4651,6 @@
             </a:r>
           </a:p>
           <a:p>
-            <a:pPr lvl="2"/>
-            <a:r>
-              <a:rPr lang="en-US" dirty="0" smtClean="0"/>
-              <a:t>Make sure entire sheet gets sorted</a:t>
-            </a:r>
-          </a:p>
-          <a:p>
             <a:pPr lvl="1"/>
             <a:r>
               <a:rPr lang="en-US" dirty="0" smtClean="0"/>
@@ -4560,24 +4658,10 @@
             </a:r>
           </a:p>
           <a:p>
-            <a:pPr lvl="2"/>
-            <a:r>
-              <a:rPr lang="en-US" dirty="0" smtClean="0"/>
-              <a:t>Remember this is only part of your data: calculations only apply to that subset</a:t>
-            </a:r>
-          </a:p>
-          <a:p>
             <a:pPr lvl="1"/>
             <a:r>
               <a:rPr lang="en-US" dirty="0" smtClean="0"/>
-              <a:t>Group</a:t>
-            </a:r>
-          </a:p>
-          <a:p>
-            <a:pPr lvl="2"/>
-            <a:r>
-              <a:rPr lang="en-US" dirty="0" smtClean="0"/>
-              <a:t>ALWAYS make a copy of your data</a:t>
+              <a:t>Group with pivot tables</a:t>
             </a:r>
             <a:endParaRPr lang="en-US" dirty="0"/>
           </a:p>
@@ -4586,7 +4670,7 @@
     </p:spTree>
     <p:extLst>
       <p:ext uri="{BB962C8B-B14F-4D97-AF65-F5344CB8AC3E}">
-        <p14:creationId xmlns:p14="http://schemas.microsoft.com/office/powerpoint/2010/main" val="738435174"/>
+        <p14:creationId xmlns:p14="http://schemas.microsoft.com/office/powerpoint/2010/main" val="138442176"/>
       </p:ext>
     </p:extLst>
   </p:cSld>
@@ -4656,6 +4740,133 @@
         <p:spPr/>
         <p:txBody>
           <a:bodyPr>
+            <a:normAutofit/>
+          </a:bodyPr>
+          <a:lstStyle/>
+          <a:p>
+            <a:r>
+              <a:rPr lang="en-US" dirty="0" smtClean="0"/>
+              <a:t>WARNINGS: Exploring new data:</a:t>
+            </a:r>
+          </a:p>
+          <a:p>
+            <a:pPr lvl="1"/>
+            <a:r>
+              <a:rPr lang="en-US" dirty="0" smtClean="0"/>
+              <a:t>Sort/look for outliers</a:t>
+            </a:r>
+          </a:p>
+          <a:p>
+            <a:pPr lvl="2"/>
+            <a:r>
+              <a:rPr lang="en-US" dirty="0" smtClean="0"/>
+              <a:t>Make sure entire sheet gets sorted</a:t>
+            </a:r>
+          </a:p>
+          <a:p>
+            <a:pPr lvl="1"/>
+            <a:r>
+              <a:rPr lang="en-US" dirty="0" smtClean="0"/>
+              <a:t>Filter</a:t>
+            </a:r>
+          </a:p>
+          <a:p>
+            <a:pPr lvl="2"/>
+            <a:r>
+              <a:rPr lang="en-US" dirty="0" smtClean="0"/>
+              <a:t>Remember this is only part of your data: calculations only apply to that subset</a:t>
+            </a:r>
+          </a:p>
+          <a:p>
+            <a:pPr lvl="1"/>
+            <a:r>
+              <a:rPr lang="en-US" dirty="0" smtClean="0"/>
+              <a:t>Group</a:t>
+            </a:r>
+          </a:p>
+          <a:p>
+            <a:pPr lvl="2"/>
+            <a:r>
+              <a:rPr lang="en-US" dirty="0" smtClean="0"/>
+              <a:t>ALWAYS make a copy of your data</a:t>
+            </a:r>
+            <a:endParaRPr lang="en-US" dirty="0"/>
+          </a:p>
+        </p:txBody>
+      </p:sp>
+    </p:spTree>
+    <p:extLst>
+      <p:ext uri="{BB962C8B-B14F-4D97-AF65-F5344CB8AC3E}">
+        <p14:creationId xmlns:p14="http://schemas.microsoft.com/office/powerpoint/2010/main" val="738435174"/>
+      </p:ext>
+    </p:extLst>
+  </p:cSld>
+  <p:clrMapOvr>
+    <a:masterClrMapping/>
+  </p:clrMapOvr>
+  <p:timing>
+    <p:tnLst>
+      <p:par>
+        <p:cTn xmlns:p14="http://schemas.microsoft.com/office/powerpoint/2010/main" id="1" dur="indefinite" restart="never" nodeType="tmRoot"/>
+      </p:par>
+    </p:tnLst>
+  </p:timing>
+</p:sld>
+</file>
+
+<file path=ppt/slides/slide15.xml><?xml version="1.0" encoding="utf-8"?>
+<p:sld xmlns:a="http://schemas.openxmlformats.org/drawingml/2006/main" xmlns:r="http://schemas.openxmlformats.org/officeDocument/2006/relationships" xmlns:p="http://schemas.openxmlformats.org/presentationml/2006/main">
+  <p:cSld>
+    <p:spTree>
+      <p:nvGrpSpPr>
+        <p:cNvPr id="1" name=""/>
+        <p:cNvGrpSpPr/>
+        <p:nvPr/>
+      </p:nvGrpSpPr>
+      <p:grpSpPr>
+        <a:xfrm>
+          <a:off x="0" y="0"/>
+          <a:ext cx="0" cy="0"/>
+          <a:chOff x="0" y="0"/>
+          <a:chExt cx="0" cy="0"/>
+        </a:xfrm>
+      </p:grpSpPr>
+      <p:sp>
+        <p:nvSpPr>
+          <p:cNvPr id="2" name="Title 1"/>
+          <p:cNvSpPr>
+            <a:spLocks noGrp="1"/>
+          </p:cNvSpPr>
+          <p:nvPr>
+            <p:ph type="title"/>
+          </p:nvPr>
+        </p:nvSpPr>
+        <p:spPr/>
+        <p:txBody>
+          <a:bodyPr/>
+          <a:lstStyle/>
+          <a:p>
+            <a:r>
+              <a:rPr lang="en-US" dirty="0" smtClean="0"/>
+              <a:t>Chicago city salaries</a:t>
+            </a:r>
+            <a:endParaRPr lang="en-US" dirty="0"/>
+          </a:p>
+        </p:txBody>
+      </p:sp>
+      <p:sp>
+        <p:nvSpPr>
+          <p:cNvPr id="3" name="Content Placeholder 2"/>
+          <p:cNvSpPr>
+            <a:spLocks noGrp="1"/>
+          </p:cNvSpPr>
+          <p:nvPr>
+            <p:ph idx="1"/>
+          </p:nvPr>
+        </p:nvSpPr>
+        <p:spPr/>
+        <p:txBody>
+          <a:bodyPr>
             <a:normAutofit fontScale="77500" lnSpcReduction="20000"/>
           </a:bodyPr>
           <a:lstStyle/>
@@ -4800,7 +5011,7 @@
 </p:sld>
 </file>
 
-<file path=ppt/slides/slide15.xml><?xml version="1.0" encoding="utf-8"?>
+<file path=ppt/slides/slide16.xml><?xml version="1.0" encoding="utf-8"?>
 <p:sld xmlns:a="http://schemas.openxmlformats.org/drawingml/2006/main" xmlns:r="http://schemas.openxmlformats.org/officeDocument/2006/relationships" xmlns:p="http://schemas.openxmlformats.org/presentationml/2006/main">
   <p:cSld>
     <p:spTree>
@@ -4913,7 +5124,7 @@
 </p:sld>
 </file>
 
-<file path=ppt/slides/slide16.xml><?xml version="1.0" encoding="utf-8"?>
+<file path=ppt/slides/slide17.xml><?xml version="1.0" encoding="utf-8"?>
 <p:sld xmlns:a="http://schemas.openxmlformats.org/drawingml/2006/main" xmlns:r="http://schemas.openxmlformats.org/officeDocument/2006/relationships" xmlns:p="http://schemas.openxmlformats.org/presentationml/2006/main">
   <p:cSld>
     <p:spTree>
@@ -5185,120 +5396,6 @@
 </p:sld>
 </file>
 
-<file path=ppt/slides/slide17.xml><?xml version="1.0" encoding="utf-8"?>
-<p:sld xmlns:a="http://schemas.openxmlformats.org/drawingml/2006/main" xmlns:r="http://schemas.openxmlformats.org/officeDocument/2006/relationships" xmlns:p="http://schemas.openxmlformats.org/presentationml/2006/main">
-  <p:cSld>
-    <p:spTree>
-      <p:nvGrpSpPr>
-        <p:cNvPr id="1" name=""/>
-        <p:cNvGrpSpPr/>
-        <p:nvPr/>
-      </p:nvGrpSpPr>
-      <p:grpSpPr>
-        <a:xfrm>
-          <a:off x="0" y="0"/>
-          <a:ext cx="0" cy="0"/>
-          <a:chOff x="0" y="0"/>
-          <a:chExt cx="0" cy="0"/>
-        </a:xfrm>
-      </p:grpSpPr>
-      <p:sp>
-        <p:nvSpPr>
-          <p:cNvPr id="2" name="Title 1"/>
-          <p:cNvSpPr>
-            <a:spLocks noGrp="1"/>
-          </p:cNvSpPr>
-          <p:nvPr>
-            <p:ph type="title"/>
-          </p:nvPr>
-        </p:nvSpPr>
-        <p:spPr/>
-        <p:txBody>
-          <a:bodyPr/>
-          <a:lstStyle/>
-          <a:p>
-            <a:r>
-              <a:rPr lang="en-US" dirty="0" smtClean="0"/>
-              <a:t>Crime data</a:t>
-            </a:r>
-            <a:endParaRPr lang="en-US" dirty="0"/>
-          </a:p>
-        </p:txBody>
-      </p:sp>
-      <p:sp>
-        <p:nvSpPr>
-          <p:cNvPr id="3" name="Content Placeholder 2"/>
-          <p:cNvSpPr>
-            <a:spLocks noGrp="1"/>
-          </p:cNvSpPr>
-          <p:nvPr>
-            <p:ph idx="1"/>
-          </p:nvPr>
-        </p:nvSpPr>
-        <p:spPr/>
-        <p:txBody>
-          <a:bodyPr/>
-          <a:lstStyle/>
-          <a:p>
-            <a:r>
-              <a:rPr lang="en-US" dirty="0" smtClean="0"/>
-              <a:t>Questions for PIVOT TABLES!</a:t>
-            </a:r>
-          </a:p>
-          <a:p>
-            <a:pPr lvl="1"/>
-            <a:r>
-              <a:rPr lang="en-US" dirty="0" smtClean="0"/>
-              <a:t>What is the most common type of crime in our area?</a:t>
-            </a:r>
-          </a:p>
-          <a:p>
-            <a:pPr lvl="1"/>
-            <a:r>
-              <a:rPr lang="en-US" dirty="0" smtClean="0"/>
-              <a:t>What block has the most/least crimes on it?</a:t>
-            </a:r>
-          </a:p>
-          <a:p>
-            <a:pPr lvl="1"/>
-            <a:r>
-              <a:rPr lang="en-US" dirty="0" smtClean="0"/>
-              <a:t>What time of day has most/least crimes?</a:t>
-            </a:r>
-          </a:p>
-          <a:p>
-            <a:pPr lvl="1"/>
-            <a:r>
-              <a:rPr lang="en-US" dirty="0" smtClean="0"/>
-              <a:t>What day of week has most/least crimes?</a:t>
-            </a:r>
-          </a:p>
-          <a:p>
-            <a:pPr lvl="1"/>
-            <a:endParaRPr lang="en-US" dirty="0"/>
-          </a:p>
-        </p:txBody>
-      </p:sp>
-    </p:spTree>
-    <p:extLst>
-      <p:ext uri="{BB962C8B-B14F-4D97-AF65-F5344CB8AC3E}">
-        <p14:creationId xmlns:p14="http://schemas.microsoft.com/office/powerpoint/2010/main" val="809957858"/>
-      </p:ext>
-    </p:extLst>
-  </p:cSld>
-  <p:clrMapOvr>
-    <a:masterClrMapping/>
-  </p:clrMapOvr>
-  <p:timing>
-    <p:tnLst>
-      <p:par>
-        <p:cTn xmlns:p14="http://schemas.microsoft.com/office/powerpoint/2010/main" id="1" dur="indefinite" restart="never" nodeType="tmRoot"/>
-      </p:par>
-    </p:tnLst>
-  </p:timing>
-</p:sld>
-</file>
-
 <file path=ppt/slides/slide18.xml><?xml version="1.0" encoding="utf-8"?>
 <p:sld xmlns:a="http://schemas.openxmlformats.org/drawingml/2006/main" xmlns:r="http://schemas.openxmlformats.org/officeDocument/2006/relationships" xmlns:p="http://schemas.openxmlformats.org/presentationml/2006/main">
   <p:cSld>
@@ -5354,43 +5451,37 @@
           <a:bodyPr/>
           <a:lstStyle/>
           <a:p>
+            <a:r>
+              <a:rPr lang="en-US" dirty="0" smtClean="0"/>
+              <a:t>Questions for PIVOT TABLES!</a:t>
+            </a:r>
+          </a:p>
+          <a:p>
             <a:pPr lvl="1"/>
             <a:r>
               <a:rPr lang="en-US" dirty="0" smtClean="0"/>
-              <a:t>Find something interesting in the 1,000-foot radius around somewhere else in DC (could be your home, your internship office, a landmark, </a:t>
-            </a:r>
-            <a:r>
-              <a:rPr lang="en-US" dirty="0" err="1" smtClean="0"/>
-              <a:t>etc</a:t>
-            </a:r>
-            <a:r>
-              <a:rPr lang="en-US" dirty="0" smtClean="0"/>
-              <a:t>)</a:t>
+              <a:t>What is the most common type of crime in our area?</a:t>
             </a:r>
           </a:p>
           <a:p>
             <a:pPr lvl="1"/>
             <a:r>
-              <a:rPr lang="en-US" dirty="0" smtClean="0">
-                <a:hlinkClick r:id="rId2"/>
-              </a:rPr>
-              <a:t>http</a:t>
-            </a:r>
-            <a:r>
-              <a:rPr lang="en-US" dirty="0">
-                <a:hlinkClick r:id="rId2"/>
-              </a:rPr>
-              <a:t>://crimemap.dc.gov/</a:t>
-            </a:r>
-            <a:r>
-              <a:rPr lang="en-US" dirty="0" smtClean="0">
-                <a:hlinkClick r:id="rId2"/>
-              </a:rPr>
-              <a:t>CrimeMapSearch.aspx</a:t>
-            </a:r>
-            <a:r>
-              <a:rPr lang="en-US" dirty="0" smtClean="0"/>
-              <a:t> </a:t>
+              <a:rPr lang="en-US" dirty="0" smtClean="0"/>
+              <a:t>What block has the most/least crimes on it?</a:t>
+            </a:r>
+          </a:p>
+          <a:p>
+            <a:pPr lvl="1"/>
+            <a:r>
+              <a:rPr lang="en-US" dirty="0" smtClean="0"/>
+              <a:t>What time of day has most/least crimes?</a:t>
+            </a:r>
+          </a:p>
+          <a:p>
+            <a:pPr lvl="1"/>
+            <a:r>
+              <a:rPr lang="en-US" dirty="0" smtClean="0"/>
+              <a:t>What day of week has most/least crimes?</a:t>
             </a:r>
           </a:p>
           <a:p>
@@ -5402,7 +5493,7 @@
     </p:spTree>
     <p:extLst>
       <p:ext uri="{BB962C8B-B14F-4D97-AF65-F5344CB8AC3E}">
-        <p14:creationId xmlns:p14="http://schemas.microsoft.com/office/powerpoint/2010/main" val="3713340471"/>
+        <p14:creationId xmlns:p14="http://schemas.microsoft.com/office/powerpoint/2010/main" val="809957858"/>
       </p:ext>
     </p:extLst>
   </p:cSld>
@@ -5453,7 +5544,7 @@
           <a:p>
             <a:r>
               <a:rPr lang="en-US" dirty="0" smtClean="0"/>
-              <a:t>Combining datasets</a:t>
+              <a:t>Crime data</a:t>
             </a:r>
             <a:endParaRPr lang="en-US" dirty="0"/>
           </a:p>
@@ -5474,38 +5565,47 @@
           <a:bodyPr/>
           <a:lstStyle/>
           <a:p>
-            <a:r>
-              <a:rPr lang="en-US" dirty="0" smtClean="0"/>
-              <a:t>We can use </a:t>
+            <a:pPr lvl="1"/>
+            <a:r>
+              <a:rPr lang="en-US" dirty="0" smtClean="0"/>
+              <a:t>Find something interesting in the 1,000-foot radius around somewhere else in DC (could be your home, your internship office, a landmark, </a:t>
             </a:r>
             <a:r>
               <a:rPr lang="en-US" dirty="0" err="1" smtClean="0"/>
-              <a:t>Goolge</a:t>
-            </a:r>
-            <a:r>
-              <a:rPr lang="en-US" dirty="0" smtClean="0"/>
-              <a:t> Fusion tables to “merge” datasets that have a common key.</a:t>
-            </a:r>
-          </a:p>
-          <a:p>
-            <a:r>
-              <a:rPr lang="en-US" dirty="0"/>
-              <a:t>Download all_dc_30_days_crime.csv and </a:t>
-            </a:r>
-            <a:r>
-              <a:rPr lang="en-US" dirty="0" smtClean="0"/>
-              <a:t>comp_table_wd12.csv</a:t>
-            </a:r>
-          </a:p>
-          <a:p>
-            <a:r>
-              <a:rPr lang="en-US" dirty="0" smtClean="0"/>
-              <a:t>Go to </a:t>
-            </a:r>
-            <a:r>
-              <a:rPr lang="en-US" dirty="0" err="1" smtClean="0"/>
-              <a:t>drive.google.com</a:t>
-            </a:r>
+              <a:t>etc</a:t>
+            </a:r>
+            <a:r>
+              <a:rPr lang="en-US" dirty="0" smtClean="0"/>
+              <a:t>) using data from the last year</a:t>
+            </a:r>
+          </a:p>
+          <a:p>
+            <a:pPr lvl="1"/>
+            <a:r>
+              <a:rPr lang="en-US" dirty="0" smtClean="0">
+                <a:hlinkClick r:id="rId2"/>
+              </a:rPr>
+              <a:t>http</a:t>
+            </a:r>
+            <a:r>
+              <a:rPr lang="en-US" dirty="0">
+                <a:hlinkClick r:id="rId2"/>
+              </a:rPr>
+              <a:t>://crimemap.dc.gov/</a:t>
+            </a:r>
+            <a:r>
+              <a:rPr lang="en-US" dirty="0" smtClean="0">
+                <a:hlinkClick r:id="rId2"/>
+              </a:rPr>
+              <a:t>CrimeMapSearch.aspx</a:t>
+            </a:r>
+            <a:r>
+              <a:rPr lang="en-US" dirty="0" smtClean="0"/>
+              <a:t> </a:t>
+            </a:r>
+          </a:p>
+          <a:p>
+            <a:pPr lvl="1"/>
             <a:endParaRPr lang="en-US" dirty="0"/>
           </a:p>
         </p:txBody>
@@ -5513,13 +5613,20 @@
     </p:spTree>
     <p:extLst>
       <p:ext uri="{BB962C8B-B14F-4D97-AF65-F5344CB8AC3E}">
-        <p14:creationId xmlns:p14="http://schemas.microsoft.com/office/powerpoint/2010/main" val="2125573992"/>
+        <p14:creationId xmlns:p14="http://schemas.microsoft.com/office/powerpoint/2010/main" val="3713340471"/>
       </p:ext>
     </p:extLst>
   </p:cSld>
   <p:clrMapOvr>
     <a:masterClrMapping/>
   </p:clrMapOvr>
+  <p:timing>
+    <p:tnLst>
+      <p:par>
+        <p:cTn xmlns:p14="http://schemas.microsoft.com/office/powerpoint/2010/main" id="1" dur="indefinite" restart="never" nodeType="tmRoot"/>
+      </p:par>
+    </p:tnLst>
+  </p:timing>
 </p:sld>
 </file>
 
@@ -5580,6 +5687,110 @@
       </p:par>
     </p:tnLst>
   </p:timing>
+</p:sld>
+</file>
+
+<file path=ppt/slides/slide20.xml><?xml version="1.0" encoding="utf-8"?>
+<p:sld xmlns:a="http://schemas.openxmlformats.org/drawingml/2006/main" xmlns:r="http://schemas.openxmlformats.org/officeDocument/2006/relationships" xmlns:p="http://schemas.openxmlformats.org/presentationml/2006/main">
+  <p:cSld>
+    <p:spTree>
+      <p:nvGrpSpPr>
+        <p:cNvPr id="1" name=""/>
+        <p:cNvGrpSpPr/>
+        <p:nvPr/>
+      </p:nvGrpSpPr>
+      <p:grpSpPr>
+        <a:xfrm>
+          <a:off x="0" y="0"/>
+          <a:ext cx="0" cy="0"/>
+          <a:chOff x="0" y="0"/>
+          <a:chExt cx="0" cy="0"/>
+        </a:xfrm>
+      </p:grpSpPr>
+      <p:sp>
+        <p:nvSpPr>
+          <p:cNvPr id="2" name="Title 1"/>
+          <p:cNvSpPr>
+            <a:spLocks noGrp="1"/>
+          </p:cNvSpPr>
+          <p:nvPr>
+            <p:ph type="title"/>
+          </p:nvPr>
+        </p:nvSpPr>
+        <p:spPr/>
+        <p:txBody>
+          <a:bodyPr/>
+          <a:lstStyle/>
+          <a:p>
+            <a:r>
+              <a:rPr lang="en-US" dirty="0" smtClean="0"/>
+              <a:t>Combining datasets</a:t>
+            </a:r>
+            <a:endParaRPr lang="en-US" dirty="0"/>
+          </a:p>
+        </p:txBody>
+      </p:sp>
+      <p:sp>
+        <p:nvSpPr>
+          <p:cNvPr id="3" name="Content Placeholder 2"/>
+          <p:cNvSpPr>
+            <a:spLocks noGrp="1"/>
+          </p:cNvSpPr>
+          <p:nvPr>
+            <p:ph idx="1"/>
+          </p:nvPr>
+        </p:nvSpPr>
+        <p:spPr/>
+        <p:txBody>
+          <a:bodyPr/>
+          <a:lstStyle/>
+          <a:p>
+            <a:r>
+              <a:rPr lang="en-US" dirty="0" smtClean="0"/>
+              <a:t>We can use </a:t>
+            </a:r>
+            <a:r>
+              <a:rPr lang="en-US" dirty="0" err="1" smtClean="0"/>
+              <a:t>Goolge</a:t>
+            </a:r>
+            <a:r>
+              <a:rPr lang="en-US" dirty="0" smtClean="0"/>
+              <a:t> Fusion tables to “merge” datasets that have a common key.</a:t>
+            </a:r>
+          </a:p>
+          <a:p>
+            <a:r>
+              <a:rPr lang="en-US" dirty="0"/>
+              <a:t>Download all_dc_30_days_crime.csv and </a:t>
+            </a:r>
+            <a:r>
+              <a:rPr lang="en-US" dirty="0" smtClean="0"/>
+              <a:t>comp_table_wd12.csv</a:t>
+            </a:r>
+          </a:p>
+          <a:p>
+            <a:r>
+              <a:rPr lang="en-US" dirty="0" smtClean="0"/>
+              <a:t>Go to </a:t>
+            </a:r>
+            <a:r>
+              <a:rPr lang="en-US" dirty="0" err="1" smtClean="0"/>
+              <a:t>drive.google.com</a:t>
+            </a:r>
+            <a:endParaRPr lang="en-US" dirty="0"/>
+          </a:p>
+        </p:txBody>
+      </p:sp>
+    </p:spTree>
+    <p:extLst>
+      <p:ext uri="{BB962C8B-B14F-4D97-AF65-F5344CB8AC3E}">
+        <p14:creationId xmlns:p14="http://schemas.microsoft.com/office/powerpoint/2010/main" val="2125573992"/>
+      </p:ext>
+    </p:extLst>
+  </p:cSld>
+  <p:clrMapOvr>
+    <a:masterClrMapping/>
+  </p:clrMapOvr>
 </p:sld>
 </file>
 
@@ -5760,10 +5971,9 @@
               <a:buChar char="-"/>
             </a:pPr>
             <a:r>
-              <a:rPr lang="mr-IN" dirty="0" smtClean="0"/>
-              <a:t>…</a:t>
-            </a:r>
-            <a:endParaRPr lang="en-US" dirty="0" smtClean="0"/>
+              <a:rPr lang="en-US" dirty="0" smtClean="0"/>
+              <a:t>Interviewing data</a:t>
+            </a:r>
           </a:p>
           <a:p>
             <a:pPr>
@@ -5789,8 +5999,16 @@
               <a:buChar char="-"/>
             </a:pPr>
             <a:r>
-              <a:rPr lang="mr-IN" dirty="0" smtClean="0"/>
-              <a:t>…</a:t>
+              <a:rPr lang="en-US" dirty="0" smtClean="0"/>
+              <a:t>Data </a:t>
+            </a:r>
+            <a:r>
+              <a:rPr lang="en-US" dirty="0" err="1" smtClean="0"/>
+              <a:t>anlaysis</a:t>
+            </a:r>
+            <a:r>
+              <a:rPr lang="en-US" dirty="0" smtClean="0"/>
+              <a:t> in Excel</a:t>
             </a:r>
             <a:endParaRPr lang="en-US" dirty="0" smtClean="0"/>
           </a:p>

</xml_diff>